<commit_message>
minor fix in CI presentation
</commit_message>
<xml_diff>
--- a/presentation/Continuous_Integration.pptx
+++ b/presentation/Continuous_Integration.pptx
@@ -8314,6 +8314,35 @@
           </a:p>
         </p:txBody>
       </p:sp>
+      <p:sp>
+        <p:nvSpPr>
+          <p:cNvPr id="6" name="TextBox 5"/>
+          <p:cNvSpPr txBox="1"/>
+          <p:nvPr/>
+        </p:nvSpPr>
+        <p:spPr>
+          <a:xfrm>
+            <a:off x="155483" y="5887959"/>
+            <a:ext cx="4454617" cy="276999"/>
+          </a:xfrm>
+          <a:prstGeom prst="rect">
+            <a:avLst/>
+          </a:prstGeom>
+          <a:noFill/>
+        </p:spPr>
+        <p:txBody>
+          <a:bodyPr wrap="none" rtlCol="0">
+            <a:spAutoFit/>
+          </a:bodyPr>
+          <a:lstStyle/>
+          <a:p>
+            <a:r>
+              <a:rPr lang="en-US" sz="1200" dirty="0"/>
+              <a:t>http://www.agileproductdesign.com/blog/the_new_backlog.html</a:t>
+            </a:r>
+          </a:p>
+        </p:txBody>
+      </p:sp>
     </p:spTree>
     <p:extLst>
       <p:ext uri="{BB962C8B-B14F-4D97-AF65-F5344CB8AC3E}">

</xml_diff>